<commit_message>
deadline made, status in submitted post, email.php  and phpMailer class added
</commit_message>
<xml_diff>
--- a/files/Request_Tracker.pptx
+++ b/files/Request_Tracker.pptx
@@ -224,7 +224,7 @@
           <a:p>
             <a:fld id="{168750A3-8A12-4688-BB53-F159F99EB655}" type="datetimeFigureOut">
               <a:rPr lang="en-US" smtClean="0"/>
-              <a:t>6/17/2015</a:t>
+              <a:t>6/23/2015</a:t>
             </a:fld>
             <a:endParaRPr lang="en-US"/>
           </a:p>
@@ -1099,7 +1099,7 @@
           <a:p>
             <a:fld id="{639A85EA-39C0-4570-974F-D9D59ABBE855}" type="datetimeFigureOut">
               <a:rPr lang="en-US" smtClean="0"/>
-              <a:t>6/17/2015</a:t>
+              <a:t>6/23/2015</a:t>
             </a:fld>
             <a:endParaRPr lang="en-US"/>
           </a:p>
@@ -1289,7 +1289,7 @@
           <a:p>
             <a:fld id="{639A85EA-39C0-4570-974F-D9D59ABBE855}" type="datetimeFigureOut">
               <a:rPr lang="en-US" smtClean="0"/>
-              <a:t>6/17/2015</a:t>
+              <a:t>6/23/2015</a:t>
             </a:fld>
             <a:endParaRPr lang="en-US"/>
           </a:p>
@@ -1489,7 +1489,7 @@
           <a:p>
             <a:fld id="{639A85EA-39C0-4570-974F-D9D59ABBE855}" type="datetimeFigureOut">
               <a:rPr lang="en-US" smtClean="0"/>
-              <a:t>6/17/2015</a:t>
+              <a:t>6/23/2015</a:t>
             </a:fld>
             <a:endParaRPr lang="en-US"/>
           </a:p>
@@ -1698,7 +1698,7 @@
           <a:p>
             <a:fld id="{639A85EA-39C0-4570-974F-D9D59ABBE855}" type="datetimeFigureOut">
               <a:rPr lang="en-US" smtClean="0"/>
-              <a:t>6/17/2015</a:t>
+              <a:t>6/23/2015</a:t>
             </a:fld>
             <a:endParaRPr lang="en-US"/>
           </a:p>
@@ -1888,7 +1888,7 @@
           <a:p>
             <a:fld id="{639A85EA-39C0-4570-974F-D9D59ABBE855}" type="datetimeFigureOut">
               <a:rPr lang="en-US" smtClean="0"/>
-              <a:t>6/17/2015</a:t>
+              <a:t>6/23/2015</a:t>
             </a:fld>
             <a:endParaRPr lang="en-US"/>
           </a:p>
@@ -2101,7 +2101,7 @@
           <a:p>
             <a:fld id="{639A85EA-39C0-4570-974F-D9D59ABBE855}" type="datetimeFigureOut">
               <a:rPr lang="en-US" smtClean="0"/>
-              <a:t>6/17/2015</a:t>
+              <a:t>6/23/2015</a:t>
             </a:fld>
             <a:endParaRPr lang="en-US"/>
           </a:p>
@@ -2410,7 +2410,7 @@
           <a:p>
             <a:fld id="{639A85EA-39C0-4570-974F-D9D59ABBE855}" type="datetimeFigureOut">
               <a:rPr lang="en-US" smtClean="0"/>
-              <a:t>6/17/2015</a:t>
+              <a:t>6/23/2015</a:t>
             </a:fld>
             <a:endParaRPr lang="en-US"/>
           </a:p>
@@ -2858,7 +2858,7 @@
           <a:p>
             <a:fld id="{639A85EA-39C0-4570-974F-D9D59ABBE855}" type="datetimeFigureOut">
               <a:rPr lang="en-US" smtClean="0"/>
-              <a:t>6/17/2015</a:t>
+              <a:t>6/23/2015</a:t>
             </a:fld>
             <a:endParaRPr lang="en-US"/>
           </a:p>
@@ -2996,7 +2996,7 @@
           <a:p>
             <a:fld id="{639A85EA-39C0-4570-974F-D9D59ABBE855}" type="datetimeFigureOut">
               <a:rPr lang="en-US" smtClean="0"/>
-              <a:t>6/17/2015</a:t>
+              <a:t>6/23/2015</a:t>
             </a:fld>
             <a:endParaRPr lang="en-US"/>
           </a:p>
@@ -3111,7 +3111,7 @@
           <a:p>
             <a:fld id="{639A85EA-39C0-4570-974F-D9D59ABBE855}" type="datetimeFigureOut">
               <a:rPr lang="en-US" smtClean="0"/>
-              <a:t>6/17/2015</a:t>
+              <a:t>6/23/2015</a:t>
             </a:fld>
             <a:endParaRPr lang="en-US"/>
           </a:p>
@@ -3408,7 +3408,7 @@
           <a:p>
             <a:fld id="{639A85EA-39C0-4570-974F-D9D59ABBE855}" type="datetimeFigureOut">
               <a:rPr lang="en-US" smtClean="0"/>
-              <a:t>6/17/2015</a:t>
+              <a:t>6/23/2015</a:t>
             </a:fld>
             <a:endParaRPr lang="en-US"/>
           </a:p>
@@ -3598,7 +3598,7 @@
           <a:p>
             <a:fld id="{639A85EA-39C0-4570-974F-D9D59ABBE855}" type="datetimeFigureOut">
               <a:rPr lang="en-US" smtClean="0"/>
-              <a:t>6/17/2015</a:t>
+              <a:t>6/23/2015</a:t>
             </a:fld>
             <a:endParaRPr lang="en-US"/>
           </a:p>
@@ -3876,7 +3876,7 @@
           <a:p>
             <a:fld id="{639A85EA-39C0-4570-974F-D9D59ABBE855}" type="datetimeFigureOut">
               <a:rPr lang="en-US" smtClean="0"/>
-              <a:t>6/17/2015</a:t>
+              <a:t>6/23/2015</a:t>
             </a:fld>
             <a:endParaRPr lang="en-US"/>
           </a:p>
@@ -4066,7 +4066,7 @@
           <a:p>
             <a:fld id="{639A85EA-39C0-4570-974F-D9D59ABBE855}" type="datetimeFigureOut">
               <a:rPr lang="en-US" smtClean="0"/>
-              <a:t>6/17/2015</a:t>
+              <a:t>6/23/2015</a:t>
             </a:fld>
             <a:endParaRPr lang="en-US"/>
           </a:p>
@@ -4266,7 +4266,7 @@
           <a:p>
             <a:fld id="{639A85EA-39C0-4570-974F-D9D59ABBE855}" type="datetimeFigureOut">
               <a:rPr lang="en-US" smtClean="0"/>
-              <a:t>6/17/2015</a:t>
+              <a:t>6/23/2015</a:t>
             </a:fld>
             <a:endParaRPr lang="en-US"/>
           </a:p>
@@ -4475,7 +4475,7 @@
           <a:p>
             <a:fld id="{639A85EA-39C0-4570-974F-D9D59ABBE855}" type="datetimeFigureOut">
               <a:rPr lang="en-US" smtClean="0"/>
-              <a:t>6/17/2015</a:t>
+              <a:t>6/23/2015</a:t>
             </a:fld>
             <a:endParaRPr lang="en-US"/>
           </a:p>
@@ -4665,7 +4665,7 @@
           <a:p>
             <a:fld id="{639A85EA-39C0-4570-974F-D9D59ABBE855}" type="datetimeFigureOut">
               <a:rPr lang="en-US" smtClean="0"/>
-              <a:t>6/17/2015</a:t>
+              <a:t>6/23/2015</a:t>
             </a:fld>
             <a:endParaRPr lang="en-US"/>
           </a:p>
@@ -4878,7 +4878,7 @@
           <a:p>
             <a:fld id="{639A85EA-39C0-4570-974F-D9D59ABBE855}" type="datetimeFigureOut">
               <a:rPr lang="en-US" smtClean="0"/>
-              <a:t>6/17/2015</a:t>
+              <a:t>6/23/2015</a:t>
             </a:fld>
             <a:endParaRPr lang="en-US"/>
           </a:p>
@@ -5187,7 +5187,7 @@
           <a:p>
             <a:fld id="{639A85EA-39C0-4570-974F-D9D59ABBE855}" type="datetimeFigureOut">
               <a:rPr lang="en-US" smtClean="0"/>
-              <a:t>6/17/2015</a:t>
+              <a:t>6/23/2015</a:t>
             </a:fld>
             <a:endParaRPr lang="en-US"/>
           </a:p>
@@ -5635,7 +5635,7 @@
           <a:p>
             <a:fld id="{639A85EA-39C0-4570-974F-D9D59ABBE855}" type="datetimeFigureOut">
               <a:rPr lang="en-US" smtClean="0"/>
-              <a:t>6/17/2015</a:t>
+              <a:t>6/23/2015</a:t>
             </a:fld>
             <a:endParaRPr lang="en-US"/>
           </a:p>
@@ -5773,7 +5773,7 @@
           <a:p>
             <a:fld id="{639A85EA-39C0-4570-974F-D9D59ABBE855}" type="datetimeFigureOut">
               <a:rPr lang="en-US" smtClean="0"/>
-              <a:t>6/17/2015</a:t>
+              <a:t>6/23/2015</a:t>
             </a:fld>
             <a:endParaRPr lang="en-US"/>
           </a:p>
@@ -5888,7 +5888,7 @@
           <a:p>
             <a:fld id="{639A85EA-39C0-4570-974F-D9D59ABBE855}" type="datetimeFigureOut">
               <a:rPr lang="en-US" smtClean="0"/>
-              <a:t>6/17/2015</a:t>
+              <a:t>6/23/2015</a:t>
             </a:fld>
             <a:endParaRPr lang="en-US"/>
           </a:p>
@@ -6101,7 +6101,7 @@
           <a:p>
             <a:fld id="{639A85EA-39C0-4570-974F-D9D59ABBE855}" type="datetimeFigureOut">
               <a:rPr lang="en-US" smtClean="0"/>
-              <a:t>6/17/2015</a:t>
+              <a:t>6/23/2015</a:t>
             </a:fld>
             <a:endParaRPr lang="en-US"/>
           </a:p>
@@ -6398,7 +6398,7 @@
           <a:p>
             <a:fld id="{639A85EA-39C0-4570-974F-D9D59ABBE855}" type="datetimeFigureOut">
               <a:rPr lang="en-US" smtClean="0"/>
-              <a:t>6/17/2015</a:t>
+              <a:t>6/23/2015</a:t>
             </a:fld>
             <a:endParaRPr lang="en-US"/>
           </a:p>
@@ -6676,7 +6676,7 @@
           <a:p>
             <a:fld id="{639A85EA-39C0-4570-974F-D9D59ABBE855}" type="datetimeFigureOut">
               <a:rPr lang="en-US" smtClean="0"/>
-              <a:t>6/17/2015</a:t>
+              <a:t>6/23/2015</a:t>
             </a:fld>
             <a:endParaRPr lang="en-US"/>
           </a:p>
@@ -6866,7 +6866,7 @@
           <a:p>
             <a:fld id="{639A85EA-39C0-4570-974F-D9D59ABBE855}" type="datetimeFigureOut">
               <a:rPr lang="en-US" smtClean="0"/>
-              <a:t>6/17/2015</a:t>
+              <a:t>6/23/2015</a:t>
             </a:fld>
             <a:endParaRPr lang="en-US"/>
           </a:p>
@@ -7066,7 +7066,7 @@
           <a:p>
             <a:fld id="{639A85EA-39C0-4570-974F-D9D59ABBE855}" type="datetimeFigureOut">
               <a:rPr lang="en-US" smtClean="0"/>
-              <a:t>6/17/2015</a:t>
+              <a:t>6/23/2015</a:t>
             </a:fld>
             <a:endParaRPr lang="en-US"/>
           </a:p>
@@ -7275,7 +7275,7 @@
           <a:p>
             <a:fld id="{639A85EA-39C0-4570-974F-D9D59ABBE855}" type="datetimeFigureOut">
               <a:rPr lang="en-US" smtClean="0"/>
-              <a:t>6/17/2015</a:t>
+              <a:t>6/23/2015</a:t>
             </a:fld>
             <a:endParaRPr lang="en-US"/>
           </a:p>
@@ -7465,7 +7465,7 @@
           <a:p>
             <a:fld id="{639A85EA-39C0-4570-974F-D9D59ABBE855}" type="datetimeFigureOut">
               <a:rPr lang="en-US" smtClean="0"/>
-              <a:t>6/17/2015</a:t>
+              <a:t>6/23/2015</a:t>
             </a:fld>
             <a:endParaRPr lang="en-US"/>
           </a:p>
@@ -7678,7 +7678,7 @@
           <a:p>
             <a:fld id="{639A85EA-39C0-4570-974F-D9D59ABBE855}" type="datetimeFigureOut">
               <a:rPr lang="en-US" smtClean="0"/>
-              <a:t>6/17/2015</a:t>
+              <a:t>6/23/2015</a:t>
             </a:fld>
             <a:endParaRPr lang="en-US"/>
           </a:p>
@@ -7987,7 +7987,7 @@
           <a:p>
             <a:fld id="{639A85EA-39C0-4570-974F-D9D59ABBE855}" type="datetimeFigureOut">
               <a:rPr lang="en-US" smtClean="0"/>
-              <a:t>6/17/2015</a:t>
+              <a:t>6/23/2015</a:t>
             </a:fld>
             <a:endParaRPr lang="en-US"/>
           </a:p>
@@ -8435,7 +8435,7 @@
           <a:p>
             <a:fld id="{639A85EA-39C0-4570-974F-D9D59ABBE855}" type="datetimeFigureOut">
               <a:rPr lang="en-US" smtClean="0"/>
-              <a:t>6/17/2015</a:t>
+              <a:t>6/23/2015</a:t>
             </a:fld>
             <a:endParaRPr lang="en-US"/>
           </a:p>
@@ -8573,7 +8573,7 @@
           <a:p>
             <a:fld id="{639A85EA-39C0-4570-974F-D9D59ABBE855}" type="datetimeFigureOut">
               <a:rPr lang="en-US" smtClean="0"/>
-              <a:t>6/17/2015</a:t>
+              <a:t>6/23/2015</a:t>
             </a:fld>
             <a:endParaRPr lang="en-US"/>
           </a:p>
@@ -8882,7 +8882,7 @@
           <a:p>
             <a:fld id="{639A85EA-39C0-4570-974F-D9D59ABBE855}" type="datetimeFigureOut">
               <a:rPr lang="en-US" smtClean="0"/>
-              <a:t>6/17/2015</a:t>
+              <a:t>6/23/2015</a:t>
             </a:fld>
             <a:endParaRPr lang="en-US"/>
           </a:p>
@@ -8997,7 +8997,7 @@
           <a:p>
             <a:fld id="{639A85EA-39C0-4570-974F-D9D59ABBE855}" type="datetimeFigureOut">
               <a:rPr lang="en-US" smtClean="0"/>
-              <a:t>6/17/2015</a:t>
+              <a:t>6/23/2015</a:t>
             </a:fld>
             <a:endParaRPr lang="en-US"/>
           </a:p>
@@ -9294,7 +9294,7 @@
           <a:p>
             <a:fld id="{639A85EA-39C0-4570-974F-D9D59ABBE855}" type="datetimeFigureOut">
               <a:rPr lang="en-US" smtClean="0"/>
-              <a:t>6/17/2015</a:t>
+              <a:t>6/23/2015</a:t>
             </a:fld>
             <a:endParaRPr lang="en-US"/>
           </a:p>
@@ -9572,7 +9572,7 @@
           <a:p>
             <a:fld id="{639A85EA-39C0-4570-974F-D9D59ABBE855}" type="datetimeFigureOut">
               <a:rPr lang="en-US" smtClean="0"/>
-              <a:t>6/17/2015</a:t>
+              <a:t>6/23/2015</a:t>
             </a:fld>
             <a:endParaRPr lang="en-US"/>
           </a:p>
@@ -9762,7 +9762,7 @@
           <a:p>
             <a:fld id="{639A85EA-39C0-4570-974F-D9D59ABBE855}" type="datetimeFigureOut">
               <a:rPr lang="en-US" smtClean="0"/>
-              <a:t>6/17/2015</a:t>
+              <a:t>6/23/2015</a:t>
             </a:fld>
             <a:endParaRPr lang="en-US"/>
           </a:p>
@@ -9962,7 +9962,7 @@
           <a:p>
             <a:fld id="{639A85EA-39C0-4570-974F-D9D59ABBE855}" type="datetimeFigureOut">
               <a:rPr lang="en-US" smtClean="0"/>
-              <a:t>6/17/2015</a:t>
+              <a:t>6/23/2015</a:t>
             </a:fld>
             <a:endParaRPr lang="en-US"/>
           </a:p>
@@ -10171,7 +10171,7 @@
           <a:p>
             <a:fld id="{639A85EA-39C0-4570-974F-D9D59ABBE855}" type="datetimeFigureOut">
               <a:rPr lang="en-US" smtClean="0"/>
-              <a:t>6/17/2015</a:t>
+              <a:t>6/23/2015</a:t>
             </a:fld>
             <a:endParaRPr lang="en-US"/>
           </a:p>
@@ -10361,7 +10361,7 @@
           <a:p>
             <a:fld id="{639A85EA-39C0-4570-974F-D9D59ABBE855}" type="datetimeFigureOut">
               <a:rPr lang="en-US" smtClean="0"/>
-              <a:t>6/17/2015</a:t>
+              <a:t>6/23/2015</a:t>
             </a:fld>
             <a:endParaRPr lang="en-US"/>
           </a:p>
@@ -10574,7 +10574,7 @@
           <a:p>
             <a:fld id="{639A85EA-39C0-4570-974F-D9D59ABBE855}" type="datetimeFigureOut">
               <a:rPr lang="en-US" smtClean="0"/>
-              <a:t>6/17/2015</a:t>
+              <a:t>6/23/2015</a:t>
             </a:fld>
             <a:endParaRPr lang="en-US"/>
           </a:p>
@@ -10883,7 +10883,7 @@
           <a:p>
             <a:fld id="{639A85EA-39C0-4570-974F-D9D59ABBE855}" type="datetimeFigureOut">
               <a:rPr lang="en-US" smtClean="0"/>
-              <a:t>6/17/2015</a:t>
+              <a:t>6/23/2015</a:t>
             </a:fld>
             <a:endParaRPr lang="en-US"/>
           </a:p>
@@ -11331,7 +11331,7 @@
           <a:p>
             <a:fld id="{639A85EA-39C0-4570-974F-D9D59ABBE855}" type="datetimeFigureOut">
               <a:rPr lang="en-US" smtClean="0"/>
-              <a:t>6/17/2015</a:t>
+              <a:t>6/23/2015</a:t>
             </a:fld>
             <a:endParaRPr lang="en-US"/>
           </a:p>
@@ -11779,7 +11779,7 @@
           <a:p>
             <a:fld id="{639A85EA-39C0-4570-974F-D9D59ABBE855}" type="datetimeFigureOut">
               <a:rPr lang="en-US" smtClean="0"/>
-              <a:t>6/17/2015</a:t>
+              <a:t>6/23/2015</a:t>
             </a:fld>
             <a:endParaRPr lang="en-US"/>
           </a:p>
@@ -11917,7 +11917,7 @@
           <a:p>
             <a:fld id="{639A85EA-39C0-4570-974F-D9D59ABBE855}" type="datetimeFigureOut">
               <a:rPr lang="en-US" smtClean="0"/>
-              <a:t>6/17/2015</a:t>
+              <a:t>6/23/2015</a:t>
             </a:fld>
             <a:endParaRPr lang="en-US"/>
           </a:p>
@@ -12032,7 +12032,7 @@
           <a:p>
             <a:fld id="{639A85EA-39C0-4570-974F-D9D59ABBE855}" type="datetimeFigureOut">
               <a:rPr lang="en-US" smtClean="0"/>
-              <a:t>6/17/2015</a:t>
+              <a:t>6/23/2015</a:t>
             </a:fld>
             <a:endParaRPr lang="en-US"/>
           </a:p>
@@ -12329,7 +12329,7 @@
           <a:p>
             <a:fld id="{639A85EA-39C0-4570-974F-D9D59ABBE855}" type="datetimeFigureOut">
               <a:rPr lang="en-US" smtClean="0"/>
-              <a:t>6/17/2015</a:t>
+              <a:t>6/23/2015</a:t>
             </a:fld>
             <a:endParaRPr lang="en-US"/>
           </a:p>
@@ -12607,7 +12607,7 @@
           <a:p>
             <a:fld id="{639A85EA-39C0-4570-974F-D9D59ABBE855}" type="datetimeFigureOut">
               <a:rPr lang="en-US" smtClean="0"/>
-              <a:t>6/17/2015</a:t>
+              <a:t>6/23/2015</a:t>
             </a:fld>
             <a:endParaRPr lang="en-US"/>
           </a:p>
@@ -12797,7 +12797,7 @@
           <a:p>
             <a:fld id="{639A85EA-39C0-4570-974F-D9D59ABBE855}" type="datetimeFigureOut">
               <a:rPr lang="en-US" smtClean="0"/>
-              <a:t>6/17/2015</a:t>
+              <a:t>6/23/2015</a:t>
             </a:fld>
             <a:endParaRPr lang="en-US"/>
           </a:p>
@@ -12997,7 +12997,7 @@
           <a:p>
             <a:fld id="{639A85EA-39C0-4570-974F-D9D59ABBE855}" type="datetimeFigureOut">
               <a:rPr lang="en-US" smtClean="0"/>
-              <a:t>6/17/2015</a:t>
+              <a:t>6/23/2015</a:t>
             </a:fld>
             <a:endParaRPr lang="en-US"/>
           </a:p>
@@ -13206,7 +13206,7 @@
           <a:p>
             <a:fld id="{639A85EA-39C0-4570-974F-D9D59ABBE855}" type="datetimeFigureOut">
               <a:rPr lang="en-US" smtClean="0"/>
-              <a:t>6/17/2015</a:t>
+              <a:t>6/23/2015</a:t>
             </a:fld>
             <a:endParaRPr lang="en-US"/>
           </a:p>
@@ -13396,7 +13396,7 @@
           <a:p>
             <a:fld id="{639A85EA-39C0-4570-974F-D9D59ABBE855}" type="datetimeFigureOut">
               <a:rPr lang="en-US" smtClean="0"/>
-              <a:t>6/17/2015</a:t>
+              <a:t>6/23/2015</a:t>
             </a:fld>
             <a:endParaRPr lang="en-US"/>
           </a:p>
@@ -13609,7 +13609,7 @@
           <a:p>
             <a:fld id="{639A85EA-39C0-4570-974F-D9D59ABBE855}" type="datetimeFigureOut">
               <a:rPr lang="en-US" smtClean="0"/>
-              <a:t>6/17/2015</a:t>
+              <a:t>6/23/2015</a:t>
             </a:fld>
             <a:endParaRPr lang="en-US"/>
           </a:p>
@@ -13918,7 +13918,7 @@
           <a:p>
             <a:fld id="{639A85EA-39C0-4570-974F-D9D59ABBE855}" type="datetimeFigureOut">
               <a:rPr lang="en-US" smtClean="0"/>
-              <a:t>6/17/2015</a:t>
+              <a:t>6/23/2015</a:t>
             </a:fld>
             <a:endParaRPr lang="en-US"/>
           </a:p>
@@ -14056,7 +14056,7 @@
           <a:p>
             <a:fld id="{639A85EA-39C0-4570-974F-D9D59ABBE855}" type="datetimeFigureOut">
               <a:rPr lang="en-US" smtClean="0"/>
-              <a:t>6/17/2015</a:t>
+              <a:t>6/23/2015</a:t>
             </a:fld>
             <a:endParaRPr lang="en-US"/>
           </a:p>
@@ -14504,7 +14504,7 @@
           <a:p>
             <a:fld id="{639A85EA-39C0-4570-974F-D9D59ABBE855}" type="datetimeFigureOut">
               <a:rPr lang="en-US" smtClean="0"/>
-              <a:t>6/17/2015</a:t>
+              <a:t>6/23/2015</a:t>
             </a:fld>
             <a:endParaRPr lang="en-US"/>
           </a:p>
@@ -14642,7 +14642,7 @@
           <a:p>
             <a:fld id="{639A85EA-39C0-4570-974F-D9D59ABBE855}" type="datetimeFigureOut">
               <a:rPr lang="en-US" smtClean="0"/>
-              <a:t>6/17/2015</a:t>
+              <a:t>6/23/2015</a:t>
             </a:fld>
             <a:endParaRPr lang="en-US"/>
           </a:p>
@@ -14757,7 +14757,7 @@
           <a:p>
             <a:fld id="{639A85EA-39C0-4570-974F-D9D59ABBE855}" type="datetimeFigureOut">
               <a:rPr lang="en-US" smtClean="0"/>
-              <a:t>6/17/2015</a:t>
+              <a:t>6/23/2015</a:t>
             </a:fld>
             <a:endParaRPr lang="en-US"/>
           </a:p>
@@ -15054,7 +15054,7 @@
           <a:p>
             <a:fld id="{639A85EA-39C0-4570-974F-D9D59ABBE855}" type="datetimeFigureOut">
               <a:rPr lang="en-US" smtClean="0"/>
-              <a:t>6/17/2015</a:t>
+              <a:t>6/23/2015</a:t>
             </a:fld>
             <a:endParaRPr lang="en-US"/>
           </a:p>
@@ -15332,7 +15332,7 @@
           <a:p>
             <a:fld id="{639A85EA-39C0-4570-974F-D9D59ABBE855}" type="datetimeFigureOut">
               <a:rPr lang="en-US" smtClean="0"/>
-              <a:t>6/17/2015</a:t>
+              <a:t>6/23/2015</a:t>
             </a:fld>
             <a:endParaRPr lang="en-US"/>
           </a:p>
@@ -15522,7 +15522,7 @@
           <a:p>
             <a:fld id="{639A85EA-39C0-4570-974F-D9D59ABBE855}" type="datetimeFigureOut">
               <a:rPr lang="en-US" smtClean="0"/>
-              <a:t>6/17/2015</a:t>
+              <a:t>6/23/2015</a:t>
             </a:fld>
             <a:endParaRPr lang="en-US"/>
           </a:p>
@@ -15722,7 +15722,7 @@
           <a:p>
             <a:fld id="{639A85EA-39C0-4570-974F-D9D59ABBE855}" type="datetimeFigureOut">
               <a:rPr lang="en-US" smtClean="0"/>
-              <a:t>6/17/2015</a:t>
+              <a:t>6/23/2015</a:t>
             </a:fld>
             <a:endParaRPr lang="en-US"/>
           </a:p>
@@ -15931,7 +15931,7 @@
           <a:p>
             <a:fld id="{639A85EA-39C0-4570-974F-D9D59ABBE855}" type="datetimeFigureOut">
               <a:rPr lang="en-US" smtClean="0"/>
-              <a:t>6/17/2015</a:t>
+              <a:t>6/23/2015</a:t>
             </a:fld>
             <a:endParaRPr lang="en-US"/>
           </a:p>
@@ -16121,7 +16121,7 @@
           <a:p>
             <a:fld id="{639A85EA-39C0-4570-974F-D9D59ABBE855}" type="datetimeFigureOut">
               <a:rPr lang="en-US" smtClean="0"/>
-              <a:t>6/17/2015</a:t>
+              <a:t>6/23/2015</a:t>
             </a:fld>
             <a:endParaRPr lang="en-US"/>
           </a:p>
@@ -16334,7 +16334,7 @@
           <a:p>
             <a:fld id="{639A85EA-39C0-4570-974F-D9D59ABBE855}" type="datetimeFigureOut">
               <a:rPr lang="en-US" smtClean="0"/>
-              <a:t>6/17/2015</a:t>
+              <a:t>6/23/2015</a:t>
             </a:fld>
             <a:endParaRPr lang="en-US"/>
           </a:p>
@@ -16449,7 +16449,7 @@
           <a:p>
             <a:fld id="{639A85EA-39C0-4570-974F-D9D59ABBE855}" type="datetimeFigureOut">
               <a:rPr lang="en-US" smtClean="0"/>
-              <a:t>6/17/2015</a:t>
+              <a:t>6/23/2015</a:t>
             </a:fld>
             <a:endParaRPr lang="en-US"/>
           </a:p>
@@ -16758,7 +16758,7 @@
           <a:p>
             <a:fld id="{639A85EA-39C0-4570-974F-D9D59ABBE855}" type="datetimeFigureOut">
               <a:rPr lang="en-US" smtClean="0"/>
-              <a:t>6/17/2015</a:t>
+              <a:t>6/23/2015</a:t>
             </a:fld>
             <a:endParaRPr lang="en-US"/>
           </a:p>
@@ -17206,7 +17206,7 @@
           <a:p>
             <a:fld id="{639A85EA-39C0-4570-974F-D9D59ABBE855}" type="datetimeFigureOut">
               <a:rPr lang="en-US" smtClean="0"/>
-              <a:t>6/17/2015</a:t>
+              <a:t>6/23/2015</a:t>
             </a:fld>
             <a:endParaRPr lang="en-US"/>
           </a:p>
@@ -17344,7 +17344,7 @@
           <a:p>
             <a:fld id="{639A85EA-39C0-4570-974F-D9D59ABBE855}" type="datetimeFigureOut">
               <a:rPr lang="en-US" smtClean="0"/>
-              <a:t>6/17/2015</a:t>
+              <a:t>6/23/2015</a:t>
             </a:fld>
             <a:endParaRPr lang="en-US"/>
           </a:p>
@@ -17459,7 +17459,7 @@
           <a:p>
             <a:fld id="{639A85EA-39C0-4570-974F-D9D59ABBE855}" type="datetimeFigureOut">
               <a:rPr lang="en-US" smtClean="0"/>
-              <a:t>6/17/2015</a:t>
+              <a:t>6/23/2015</a:t>
             </a:fld>
             <a:endParaRPr lang="en-US"/>
           </a:p>
@@ -17756,7 +17756,7 @@
           <a:p>
             <a:fld id="{639A85EA-39C0-4570-974F-D9D59ABBE855}" type="datetimeFigureOut">
               <a:rPr lang="en-US" smtClean="0"/>
-              <a:t>6/17/2015</a:t>
+              <a:t>6/23/2015</a:t>
             </a:fld>
             <a:endParaRPr lang="en-US"/>
           </a:p>
@@ -18034,7 +18034,7 @@
           <a:p>
             <a:fld id="{639A85EA-39C0-4570-974F-D9D59ABBE855}" type="datetimeFigureOut">
               <a:rPr lang="en-US" smtClean="0"/>
-              <a:t>6/17/2015</a:t>
+              <a:t>6/23/2015</a:t>
             </a:fld>
             <a:endParaRPr lang="en-US"/>
           </a:p>
@@ -18224,7 +18224,7 @@
           <a:p>
             <a:fld id="{639A85EA-39C0-4570-974F-D9D59ABBE855}" type="datetimeFigureOut">
               <a:rPr lang="en-US" smtClean="0"/>
-              <a:t>6/17/2015</a:t>
+              <a:t>6/23/2015</a:t>
             </a:fld>
             <a:endParaRPr lang="en-US"/>
           </a:p>
@@ -18424,7 +18424,7 @@
           <a:p>
             <a:fld id="{639A85EA-39C0-4570-974F-D9D59ABBE855}" type="datetimeFigureOut">
               <a:rPr lang="en-US" smtClean="0"/>
-              <a:t>6/17/2015</a:t>
+              <a:t>6/23/2015</a:t>
             </a:fld>
             <a:endParaRPr lang="en-US"/>
           </a:p>
@@ -18577,7 +18577,7 @@
           <a:p>
             <a:fld id="{639A85EA-39C0-4570-974F-D9D59ABBE855}" type="datetimeFigureOut">
               <a:rPr lang="en-US" smtClean="0"/>
-              <a:t>6/17/2015</a:t>
+              <a:t>6/23/2015</a:t>
             </a:fld>
             <a:endParaRPr lang="en-US"/>
           </a:p>
@@ -18757,7 +18757,7 @@
           <a:p>
             <a:fld id="{639A85EA-39C0-4570-974F-D9D59ABBE855}" type="datetimeFigureOut">
               <a:rPr lang="en-US" smtClean="0"/>
-              <a:t>6/17/2015</a:t>
+              <a:t>6/23/2015</a:t>
             </a:fld>
             <a:endParaRPr lang="en-US"/>
           </a:p>
@@ -19103,7 +19103,7 @@
           <a:p>
             <a:fld id="{639A85EA-39C0-4570-974F-D9D59ABBE855}" type="datetimeFigureOut">
               <a:rPr lang="en-US" smtClean="0"/>
-              <a:t>6/17/2015</a:t>
+              <a:t>6/23/2015</a:t>
             </a:fld>
             <a:endParaRPr lang="en-US"/>
           </a:p>
@@ -19310,7 +19310,7 @@
           <a:p>
             <a:fld id="{639A85EA-39C0-4570-974F-D9D59ABBE855}" type="datetimeFigureOut">
               <a:rPr lang="en-US" smtClean="0"/>
-              <a:t>6/17/2015</a:t>
+              <a:t>6/23/2015</a:t>
             </a:fld>
             <a:endParaRPr lang="en-US"/>
           </a:p>
@@ -19552,7 +19552,7 @@
           <a:p>
             <a:fld id="{639A85EA-39C0-4570-974F-D9D59ABBE855}" type="datetimeFigureOut">
               <a:rPr lang="en-US" smtClean="0"/>
-              <a:t>6/17/2015</a:t>
+              <a:t>6/23/2015</a:t>
             </a:fld>
             <a:endParaRPr lang="en-US"/>
           </a:p>
@@ -19929,7 +19929,7 @@
           <a:p>
             <a:fld id="{639A85EA-39C0-4570-974F-D9D59ABBE855}" type="datetimeFigureOut">
               <a:rPr lang="en-US" smtClean="0"/>
-              <a:t>6/17/2015</a:t>
+              <a:t>6/23/2015</a:t>
             </a:fld>
             <a:endParaRPr lang="en-US"/>
           </a:p>
@@ -20057,7 +20057,7 @@
           <a:p>
             <a:fld id="{639A85EA-39C0-4570-974F-D9D59ABBE855}" type="datetimeFigureOut">
               <a:rPr lang="en-US" smtClean="0"/>
-              <a:t>6/17/2015</a:t>
+              <a:t>6/23/2015</a:t>
             </a:fld>
             <a:endParaRPr lang="en-US"/>
           </a:p>
@@ -20162,7 +20162,7 @@
           <a:p>
             <a:fld id="{639A85EA-39C0-4570-974F-D9D59ABBE855}" type="datetimeFigureOut">
               <a:rPr lang="en-US" smtClean="0"/>
-              <a:t>6/17/2015</a:t>
+              <a:t>6/23/2015</a:t>
             </a:fld>
             <a:endParaRPr lang="en-US"/>
           </a:p>
@@ -20449,7 +20449,7 @@
           <a:p>
             <a:fld id="{639A85EA-39C0-4570-974F-D9D59ABBE855}" type="datetimeFigureOut">
               <a:rPr lang="en-US" smtClean="0"/>
-              <a:t>6/17/2015</a:t>
+              <a:t>6/23/2015</a:t>
             </a:fld>
             <a:endParaRPr lang="en-US"/>
           </a:p>
@@ -20712,7 +20712,7 @@
           <a:p>
             <a:fld id="{639A85EA-39C0-4570-974F-D9D59ABBE855}" type="datetimeFigureOut">
               <a:rPr lang="en-US" smtClean="0"/>
-              <a:t>6/17/2015</a:t>
+              <a:t>6/23/2015</a:t>
             </a:fld>
             <a:endParaRPr lang="en-US"/>
           </a:p>
@@ -20892,7 +20892,7 @@
           <a:p>
             <a:fld id="{639A85EA-39C0-4570-974F-D9D59ABBE855}" type="datetimeFigureOut">
               <a:rPr lang="en-US" smtClean="0"/>
-              <a:t>6/17/2015</a:t>
+              <a:t>6/23/2015</a:t>
             </a:fld>
             <a:endParaRPr lang="en-US"/>
           </a:p>
@@ -21082,7 +21082,7 @@
           <a:p>
             <a:fld id="{639A85EA-39C0-4570-974F-D9D59ABBE855}" type="datetimeFigureOut">
               <a:rPr lang="en-US" smtClean="0"/>
-              <a:t>6/17/2015</a:t>
+              <a:t>6/23/2015</a:t>
             </a:fld>
             <a:endParaRPr lang="en-US"/>
           </a:p>
@@ -21409,7 +21409,7 @@
           <a:p>
             <a:fld id="{639A85EA-39C0-4570-974F-D9D59ABBE855}" type="datetimeFigureOut">
               <a:rPr lang="en-US" smtClean="0"/>
-              <a:t>6/17/2015</a:t>
+              <a:t>6/23/2015</a:t>
             </a:fld>
             <a:endParaRPr lang="en-US"/>
           </a:p>
@@ -22129,7 +22129,7 @@
           <a:p>
             <a:fld id="{639A85EA-39C0-4570-974F-D9D59ABBE855}" type="datetimeFigureOut">
               <a:rPr lang="en-US" smtClean="0"/>
-              <a:t>6/17/2015</a:t>
+              <a:t>6/23/2015</a:t>
             </a:fld>
             <a:endParaRPr lang="en-US"/>
           </a:p>
@@ -23289,7 +23289,7 @@
           <a:p>
             <a:fld id="{639A85EA-39C0-4570-974F-D9D59ABBE855}" type="datetimeFigureOut">
               <a:rPr lang="en-US" smtClean="0"/>
-              <a:t>6/17/2015</a:t>
+              <a:t>6/23/2015</a:t>
             </a:fld>
             <a:endParaRPr lang="en-US"/>
           </a:p>
@@ -24449,7 +24449,7 @@
           <a:p>
             <a:fld id="{639A85EA-39C0-4570-974F-D9D59ABBE855}" type="datetimeFigureOut">
               <a:rPr lang="en-US" smtClean="0"/>
-              <a:t>6/17/2015</a:t>
+              <a:t>6/23/2015</a:t>
             </a:fld>
             <a:endParaRPr lang="en-US"/>
           </a:p>
@@ -25609,7 +25609,7 @@
           <a:p>
             <a:fld id="{639A85EA-39C0-4570-974F-D9D59ABBE855}" type="datetimeFigureOut">
               <a:rPr lang="en-US" smtClean="0"/>
-              <a:t>6/17/2015</a:t>
+              <a:t>6/23/2015</a:t>
             </a:fld>
             <a:endParaRPr lang="en-US"/>
           </a:p>
@@ -26769,7 +26769,7 @@
           <a:p>
             <a:fld id="{639A85EA-39C0-4570-974F-D9D59ABBE855}" type="datetimeFigureOut">
               <a:rPr lang="en-US" smtClean="0"/>
-              <a:t>6/17/2015</a:t>
+              <a:t>6/23/2015</a:t>
             </a:fld>
             <a:endParaRPr lang="en-US"/>
           </a:p>
@@ -27929,7 +27929,7 @@
           <a:p>
             <a:fld id="{639A85EA-39C0-4570-974F-D9D59ABBE855}" type="datetimeFigureOut">
               <a:rPr lang="en-US" smtClean="0"/>
-              <a:t>6/17/2015</a:t>
+              <a:t>6/23/2015</a:t>
             </a:fld>
             <a:endParaRPr lang="en-US"/>
           </a:p>
@@ -29089,7 +29089,7 @@
           <a:p>
             <a:fld id="{639A85EA-39C0-4570-974F-D9D59ABBE855}" type="datetimeFigureOut">
               <a:rPr lang="en-US" smtClean="0"/>
-              <a:t>6/17/2015</a:t>
+              <a:t>6/23/2015</a:t>
             </a:fld>
             <a:endParaRPr lang="en-US"/>
           </a:p>
@@ -29703,7 +29703,7 @@
           <a:p>
             <a:fld id="{639A85EA-39C0-4570-974F-D9D59ABBE855}" type="datetimeFigureOut">
               <a:rPr lang="en-US" smtClean="0"/>
-              <a:t>6/17/2015</a:t>
+              <a:t>6/23/2015</a:t>
             </a:fld>
             <a:endParaRPr lang="en-US"/>
           </a:p>
@@ -31536,8 +31536,8 @@
           <a:lstStyle/>
           <a:p>
             <a:r>
-              <a:rPr lang="en-US" dirty="0" smtClean="0"/>
-              <a:t>Student</a:t>
+              <a:rPr lang="en-US" smtClean="0"/>
+              <a:t>Moderator</a:t>
             </a:r>
             <a:endParaRPr lang="en-US" dirty="0"/>
           </a:p>
@@ -31634,7 +31634,7 @@
           <a:p>
             <a:r>
               <a:rPr lang="en-US" dirty="0" smtClean="0"/>
-              <a:t>Student</a:t>
+              <a:t>Admin</a:t>
             </a:r>
             <a:endParaRPr lang="en-US" dirty="0"/>
           </a:p>

</xml_diff>